<commit_message>
add images and clean up extraneous PPT objects
</commit_message>
<xml_diff>
--- a/NARW.pptx
+++ b/NARW.pptx
@@ -6,21 +6,1057 @@
     <p:sldMasterId id="2147483661" r:id="rId3"/>
     <p:sldMasterId id="2147483674" r:id="rId4"/>
   </p:sldMasterIdLst>
+  <p:notesMasterIdLst>
+    <p:notesMasterId r:id="rId5"/>
+  </p:notesMasterIdLst>
   <p:sldIdLst>
-    <p:sldId id="256" r:id="rId5"/>
-    <p:sldId id="257" r:id="rId6"/>
-    <p:sldId id="258" r:id="rId7"/>
-    <p:sldId id="259" r:id="rId8"/>
-    <p:sldId id="260" r:id="rId9"/>
-    <p:sldId id="261" r:id="rId10"/>
-    <p:sldId id="262" r:id="rId11"/>
-    <p:sldId id="263" r:id="rId12"/>
-    <p:sldId id="264" r:id="rId13"/>
-    <p:sldId id="265" r:id="rId14"/>
+    <p:sldId id="256" r:id="rId6"/>
+    <p:sldId id="257" r:id="rId7"/>
+    <p:sldId id="258" r:id="rId8"/>
+    <p:sldId id="259" r:id="rId9"/>
+    <p:sldId id="260" r:id="rId10"/>
+    <p:sldId id="261" r:id="rId11"/>
+    <p:sldId id="262" r:id="rId12"/>
+    <p:sldId id="263" r:id="rId13"/>
+    <p:sldId id="264" r:id="rId14"/>
+    <p:sldId id="265" r:id="rId15"/>
   </p:sldIdLst>
   <p:sldSz cx="9144000" cy="6858000"/>
   <p:notesSz cx="7772400" cy="10058400"/>
 </p:presentation>
+</file>
+
+<file path=ppt/notesMasters/notesMaster1.xml><?xml version="1.0" encoding="utf-8"?>
+<p:notesMaster xmlns:a="http://schemas.openxmlformats.org/drawingml/2006/main" xmlns:p="http://schemas.openxmlformats.org/presentationml/2006/main" xmlns:r="http://schemas.openxmlformats.org/officeDocument/2006/relationships" xmlns:p14="http://schemas.microsoft.com/office/powerpoint/2010/main" xmlns:p15="http://schemas.microsoft.com/office/powerpoint/2012/main" xmlns:mc="http://schemas.openxmlformats.org/markup-compatibility/2006">
+  <p:cSld>
+    <p:spTree>
+      <p:nvGrpSpPr>
+        <p:cNvPr id="1" name=""/>
+        <p:cNvGrpSpPr/>
+        <p:nvPr/>
+      </p:nvGrpSpPr>
+      <p:grpSpPr>
+        <a:xfrm>
+          <a:off x="0" y="0"/>
+          <a:ext cx="0" cy="0"/>
+          <a:chOff x="0" y="0"/>
+          <a:chExt cx="0" cy="0"/>
+        </a:xfrm>
+      </p:grpSpPr>
+      <p:sp>
+        <p:nvSpPr>
+          <p:cNvPr id="126" name="PlaceHolder 1"/>
+          <p:cNvSpPr>
+            <a:spLocks noGrp="1"/>
+          </p:cNvSpPr>
+          <p:nvPr>
+            <p:ph type="sldImg"/>
+          </p:nvPr>
+        </p:nvSpPr>
+        <p:spPr>
+          <a:xfrm>
+            <a:off x="533520" y="764280"/>
+            <a:ext cx="6704640" cy="3771360"/>
+          </a:xfrm>
+          <a:prstGeom prst="rect">
+            <a:avLst/>
+          </a:prstGeom>
+        </p:spPr>
+        <p:txBody>
+          <a:bodyPr lIns="0" rIns="0" tIns="0" bIns="0" anchor="ctr">
+            <a:noAutofit/>
+          </a:bodyPr>
+          <a:p>
+            <a:pPr algn="ctr"/>
+            <a:r>
+              <a:rPr b="0" lang="en-US" sz="4400" spc="-1" strike="noStrike">
+                <a:latin typeface="Arial"/>
+              </a:rPr>
+              <a:t>Click to move the slide</a:t>
+            </a:r>
+            <a:endParaRPr b="0" lang="en-US" sz="4400" spc="-1" strike="noStrike">
+              <a:latin typeface="Arial"/>
+            </a:endParaRPr>
+          </a:p>
+        </p:txBody>
+      </p:sp>
+      <p:sp>
+        <p:nvSpPr>
+          <p:cNvPr id="127" name="PlaceHolder 2"/>
+          <p:cNvSpPr>
+            <a:spLocks noGrp="1"/>
+          </p:cNvSpPr>
+          <p:nvPr>
+            <p:ph type="body"/>
+          </p:nvPr>
+        </p:nvSpPr>
+        <p:spPr>
+          <a:xfrm>
+            <a:off x="777240" y="4777560"/>
+            <a:ext cx="6217560" cy="4525920"/>
+          </a:xfrm>
+          <a:prstGeom prst="rect">
+            <a:avLst/>
+          </a:prstGeom>
+        </p:spPr>
+        <p:txBody>
+          <a:bodyPr lIns="0" rIns="0" tIns="0" bIns="0">
+            <a:noAutofit/>
+          </a:bodyPr>
+          <a:p>
+            <a:r>
+              <a:rPr b="0" lang="en-US" sz="2000" spc="-1" strike="noStrike">
+                <a:latin typeface="Arial"/>
+              </a:rPr>
+              <a:t>Click to edit the notes format</a:t>
+            </a:r>
+            <a:endParaRPr b="0" lang="en-US" sz="2000" spc="-1" strike="noStrike">
+              <a:latin typeface="Arial"/>
+            </a:endParaRPr>
+          </a:p>
+        </p:txBody>
+      </p:sp>
+      <p:sp>
+        <p:nvSpPr>
+          <p:cNvPr id="128" name="PlaceHolder 3"/>
+          <p:cNvSpPr>
+            <a:spLocks noGrp="1"/>
+          </p:cNvSpPr>
+          <p:nvPr>
+            <p:ph type="hdr"/>
+          </p:nvPr>
+        </p:nvSpPr>
+        <p:spPr>
+          <a:xfrm>
+            <a:off x="0" y="0"/>
+            <a:ext cx="3372840" cy="502560"/>
+          </a:xfrm>
+          <a:prstGeom prst="rect">
+            <a:avLst/>
+          </a:prstGeom>
+        </p:spPr>
+        <p:txBody>
+          <a:bodyPr lIns="0" rIns="0" tIns="0" bIns="0">
+            <a:noAutofit/>
+          </a:bodyPr>
+          <a:p>
+            <a:r>
+              <a:rPr b="0" lang="en-US" sz="1400" spc="-1" strike="noStrike">
+                <a:latin typeface="Times New Roman"/>
+              </a:rPr>
+              <a:t>&lt;header&gt;</a:t>
+            </a:r>
+            <a:endParaRPr b="0" lang="en-US" sz="1400" spc="-1" strike="noStrike">
+              <a:latin typeface="Times New Roman"/>
+            </a:endParaRPr>
+          </a:p>
+        </p:txBody>
+      </p:sp>
+      <p:sp>
+        <p:nvSpPr>
+          <p:cNvPr id="129" name="PlaceHolder 4"/>
+          <p:cNvSpPr>
+            <a:spLocks noGrp="1"/>
+          </p:cNvSpPr>
+          <p:nvPr>
+            <p:ph type="dt"/>
+          </p:nvPr>
+        </p:nvSpPr>
+        <p:spPr>
+          <a:xfrm>
+            <a:off x="4399200" y="0"/>
+            <a:ext cx="3372840" cy="502560"/>
+          </a:xfrm>
+          <a:prstGeom prst="rect">
+            <a:avLst/>
+          </a:prstGeom>
+        </p:spPr>
+        <p:txBody>
+          <a:bodyPr lIns="0" rIns="0" tIns="0" bIns="0">
+            <a:noAutofit/>
+          </a:bodyPr>
+          <a:p>
+            <a:pPr algn="r"/>
+            <a:r>
+              <a:rPr b="0" lang="en-US" sz="1400" spc="-1" strike="noStrike">
+                <a:latin typeface="Times New Roman"/>
+              </a:rPr>
+              <a:t>&lt;date/time&gt;</a:t>
+            </a:r>
+            <a:endParaRPr b="0" lang="en-US" sz="1400" spc="-1" strike="noStrike">
+              <a:latin typeface="Times New Roman"/>
+            </a:endParaRPr>
+          </a:p>
+        </p:txBody>
+      </p:sp>
+      <p:sp>
+        <p:nvSpPr>
+          <p:cNvPr id="130" name="PlaceHolder 5"/>
+          <p:cNvSpPr>
+            <a:spLocks noGrp="1"/>
+          </p:cNvSpPr>
+          <p:nvPr>
+            <p:ph type="ftr"/>
+          </p:nvPr>
+        </p:nvSpPr>
+        <p:spPr>
+          <a:xfrm>
+            <a:off x="0" y="9555480"/>
+            <a:ext cx="3372840" cy="502560"/>
+          </a:xfrm>
+          <a:prstGeom prst="rect">
+            <a:avLst/>
+          </a:prstGeom>
+        </p:spPr>
+        <p:txBody>
+          <a:bodyPr lIns="0" rIns="0" tIns="0" bIns="0" anchor="b">
+            <a:noAutofit/>
+          </a:bodyPr>
+          <a:p>
+            <a:r>
+              <a:rPr b="0" lang="en-US" sz="1400" spc="-1" strike="noStrike">
+                <a:latin typeface="Times New Roman"/>
+              </a:rPr>
+              <a:t>&lt;footer&gt;</a:t>
+            </a:r>
+            <a:endParaRPr b="0" lang="en-US" sz="1400" spc="-1" strike="noStrike">
+              <a:latin typeface="Times New Roman"/>
+            </a:endParaRPr>
+          </a:p>
+        </p:txBody>
+      </p:sp>
+      <p:sp>
+        <p:nvSpPr>
+          <p:cNvPr id="131" name="PlaceHolder 6"/>
+          <p:cNvSpPr>
+            <a:spLocks noGrp="1"/>
+          </p:cNvSpPr>
+          <p:nvPr>
+            <p:ph type="sldNum"/>
+          </p:nvPr>
+        </p:nvSpPr>
+        <p:spPr>
+          <a:xfrm>
+            <a:off x="4399200" y="9555480"/>
+            <a:ext cx="3372840" cy="502560"/>
+          </a:xfrm>
+          <a:prstGeom prst="rect">
+            <a:avLst/>
+          </a:prstGeom>
+        </p:spPr>
+        <p:txBody>
+          <a:bodyPr lIns="0" rIns="0" tIns="0" bIns="0" anchor="b">
+            <a:noAutofit/>
+          </a:bodyPr>
+          <a:p>
+            <a:pPr algn="r"/>
+            <a:fld id="{CCACE80D-57AE-472A-8BA8-092BAFC65691}" type="slidenum">
+              <a:rPr b="0" lang="en-US" sz="1400" spc="-1" strike="noStrike">
+                <a:latin typeface="Times New Roman"/>
+              </a:rPr>
+              <a:t>&lt;number&gt;</a:t>
+            </a:fld>
+            <a:endParaRPr b="0" lang="en-US" sz="1400" spc="-1" strike="noStrike">
+              <a:latin typeface="Times New Roman"/>
+            </a:endParaRPr>
+          </a:p>
+        </p:txBody>
+      </p:sp>
+    </p:spTree>
+  </p:cSld>
+  <p:clrMap bg1="lt1" bg2="lt2" tx1="dk1" tx2="dk2" accent1="accent1" accent2="accent2" accent3="accent3" accent4="accent4" accent5="accent5" accent6="accent6" hlink="hlink" folHlink="folHlink"/>
+</p:notesMaster>
+</file>
+
+<file path=ppt/notesSlides/notesSlide1.xml><?xml version="1.0" encoding="utf-8"?>
+<p:notes xmlns:a="http://schemas.openxmlformats.org/drawingml/2006/main" xmlns:p="http://schemas.openxmlformats.org/presentationml/2006/main" xmlns:r="http://schemas.openxmlformats.org/officeDocument/2006/relationships" xmlns:p14="http://schemas.microsoft.com/office/powerpoint/2010/main" xmlns:p15="http://schemas.microsoft.com/office/powerpoint/2012/main" xmlns:mc="http://schemas.openxmlformats.org/markup-compatibility/2006">
+  <p:cSld>
+    <p:spTree>
+      <p:nvGrpSpPr>
+        <p:cNvPr id="1" name=""/>
+        <p:cNvGrpSpPr/>
+        <p:nvPr/>
+      </p:nvGrpSpPr>
+      <p:grpSpPr>
+        <a:xfrm>
+          <a:off x="0" y="0"/>
+          <a:ext cx="0" cy="0"/>
+          <a:chOff x="0" y="0"/>
+          <a:chExt cx="0" cy="0"/>
+        </a:xfrm>
+      </p:grpSpPr>
+      <p:sp>
+        <p:nvSpPr>
+          <p:cNvPr id="157" name="PlaceHolder 1"/>
+          <p:cNvSpPr>
+            <a:spLocks noGrp="1"/>
+          </p:cNvSpPr>
+          <p:nvPr>
+            <p:ph type="sldImg"/>
+          </p:nvPr>
+        </p:nvSpPr>
+        <p:spPr>
+          <a:xfrm>
+            <a:off x="533520" y="764280"/>
+            <a:ext cx="6704640" cy="3771360"/>
+          </a:xfrm>
+          <a:prstGeom prst="rect">
+            <a:avLst/>
+          </a:prstGeom>
+        </p:spPr>
+      </p:sp>
+      <p:sp>
+        <p:nvSpPr>
+          <p:cNvPr id="158" name="PlaceHolder 2"/>
+          <p:cNvSpPr>
+            <a:spLocks noGrp="1"/>
+          </p:cNvSpPr>
+          <p:nvPr>
+            <p:ph type="body"/>
+          </p:nvPr>
+        </p:nvSpPr>
+        <p:spPr>
+          <a:xfrm>
+            <a:off x="777240" y="4777560"/>
+            <a:ext cx="6217560" cy="4525920"/>
+          </a:xfrm>
+          <a:prstGeom prst="rect">
+            <a:avLst/>
+          </a:prstGeom>
+        </p:spPr>
+        <p:txBody>
+          <a:bodyPr lIns="0" rIns="0" tIns="0" bIns="0">
+            <a:noAutofit/>
+          </a:bodyPr>
+          <a:p>
+            <a:r>
+              <a:rPr b="0" lang="en-US" sz="2000" spc="-1" strike="noStrike">
+                <a:latin typeface="Arial"/>
+              </a:rPr>
+              <a:t>Introduce yourself</a:t>
+            </a:r>
+            <a:endParaRPr b="0" lang="en-US" sz="2000" spc="-1" strike="noStrike">
+              <a:latin typeface="Arial"/>
+            </a:endParaRPr>
+          </a:p>
+          <a:p>
+            <a:r>
+              <a:rPr b="0" lang="en-US" sz="2000" spc="-1" strike="noStrike">
+                <a:latin typeface="Arial"/>
+              </a:rPr>
+              <a:t>Audience</a:t>
+            </a:r>
+            <a:endParaRPr b="0" lang="en-US" sz="2000" spc="-1" strike="noStrike">
+              <a:latin typeface="Arial"/>
+            </a:endParaRPr>
+          </a:p>
+        </p:txBody>
+      </p:sp>
+    </p:spTree>
+  </p:cSld>
+</p:notes>
+</file>
+
+<file path=ppt/notesSlides/notesSlide2.xml><?xml version="1.0" encoding="utf-8"?>
+<p:notes xmlns:a="http://schemas.openxmlformats.org/drawingml/2006/main" xmlns:p="http://schemas.openxmlformats.org/presentationml/2006/main" xmlns:r="http://schemas.openxmlformats.org/officeDocument/2006/relationships" xmlns:p14="http://schemas.microsoft.com/office/powerpoint/2010/main" xmlns:p15="http://schemas.microsoft.com/office/powerpoint/2012/main" xmlns:mc="http://schemas.openxmlformats.org/markup-compatibility/2006">
+  <p:cSld>
+    <p:spTree>
+      <p:nvGrpSpPr>
+        <p:cNvPr id="1" name=""/>
+        <p:cNvGrpSpPr/>
+        <p:nvPr/>
+      </p:nvGrpSpPr>
+      <p:grpSpPr>
+        <a:xfrm>
+          <a:off x="0" y="0"/>
+          <a:ext cx="0" cy="0"/>
+          <a:chOff x="0" y="0"/>
+          <a:chExt cx="0" cy="0"/>
+        </a:xfrm>
+      </p:grpSpPr>
+      <p:sp>
+        <p:nvSpPr>
+          <p:cNvPr id="159" name="PlaceHolder 1"/>
+          <p:cNvSpPr>
+            <a:spLocks noGrp="1"/>
+          </p:cNvSpPr>
+          <p:nvPr>
+            <p:ph type="sldImg"/>
+          </p:nvPr>
+        </p:nvSpPr>
+        <p:spPr>
+          <a:xfrm>
+            <a:off x="533520" y="764280"/>
+            <a:ext cx="6704640" cy="3771360"/>
+          </a:xfrm>
+          <a:prstGeom prst="rect">
+            <a:avLst/>
+          </a:prstGeom>
+        </p:spPr>
+      </p:sp>
+      <p:sp>
+        <p:nvSpPr>
+          <p:cNvPr id="160" name="PlaceHolder 2"/>
+          <p:cNvSpPr>
+            <a:spLocks noGrp="1"/>
+          </p:cNvSpPr>
+          <p:nvPr>
+            <p:ph type="body"/>
+          </p:nvPr>
+        </p:nvSpPr>
+        <p:spPr>
+          <a:xfrm>
+            <a:off x="777240" y="4777560"/>
+            <a:ext cx="6217560" cy="4525920"/>
+          </a:xfrm>
+          <a:prstGeom prst="rect">
+            <a:avLst/>
+          </a:prstGeom>
+        </p:spPr>
+        <p:txBody>
+          <a:bodyPr lIns="0" rIns="0" tIns="0" bIns="0">
+            <a:noAutofit/>
+          </a:bodyPr>
+          <a:p>
+            <a:r>
+              <a:rPr b="0" lang="en-US" sz="2000" spc="-1" strike="noStrike">
+                <a:latin typeface="Arial"/>
+              </a:rPr>
+              <a:t>Motivation</a:t>
+            </a:r>
+            <a:endParaRPr b="0" lang="en-US" sz="2000" spc="-1" strike="noStrike">
+              <a:latin typeface="Arial"/>
+            </a:endParaRPr>
+          </a:p>
+          <a:p>
+            <a:r>
+              <a:rPr b="0" lang="en-US" sz="2000" spc="-1" strike="noStrike">
+                <a:latin typeface="Arial"/>
+              </a:rPr>
+              <a:t>Summary</a:t>
+            </a:r>
+            <a:endParaRPr b="0" lang="en-US" sz="2000" spc="-1" strike="noStrike">
+              <a:latin typeface="Arial"/>
+            </a:endParaRPr>
+          </a:p>
+          <a:p>
+            <a:endParaRPr b="0" lang="en-US" sz="2000" spc="-1" strike="noStrike">
+              <a:latin typeface="Arial"/>
+            </a:endParaRPr>
+          </a:p>
+          <a:p>
+            <a:r>
+              <a:rPr b="0" lang="en-US" sz="2000" spc="-1" strike="noStrike">
+                <a:latin typeface="Arial"/>
+              </a:rPr>
+              <a:t>Portland showing of LOTRW</a:t>
+            </a:r>
+            <a:endParaRPr b="0" lang="en-US" sz="2000" spc="-1" strike="noStrike">
+              <a:latin typeface="Arial"/>
+            </a:endParaRPr>
+          </a:p>
+          <a:p>
+            <a:r>
+              <a:rPr b="0" lang="en-US" sz="2000" spc="-1" strike="noStrike">
+                <a:latin typeface="Arial"/>
+              </a:rPr>
+              <a:t>Belfast showing of Entanglement</a:t>
+            </a:r>
+            <a:endParaRPr b="0" lang="en-US" sz="2000" spc="-1" strike="noStrike">
+              <a:latin typeface="Arial"/>
+            </a:endParaRPr>
+          </a:p>
+          <a:p>
+            <a:endParaRPr b="0" lang="en-US" sz="2000" spc="-1" strike="noStrike">
+              <a:latin typeface="Arial"/>
+            </a:endParaRPr>
+          </a:p>
+        </p:txBody>
+      </p:sp>
+    </p:spTree>
+  </p:cSld>
+</p:notes>
+</file>
+
+<file path=ppt/notesSlides/notesSlide3.xml><?xml version="1.0" encoding="utf-8"?>
+<p:notes xmlns:a="http://schemas.openxmlformats.org/drawingml/2006/main" xmlns:p="http://schemas.openxmlformats.org/presentationml/2006/main" xmlns:r="http://schemas.openxmlformats.org/officeDocument/2006/relationships" xmlns:p14="http://schemas.microsoft.com/office/powerpoint/2010/main" xmlns:p15="http://schemas.microsoft.com/office/powerpoint/2012/main" xmlns:mc="http://schemas.openxmlformats.org/markup-compatibility/2006">
+  <p:cSld>
+    <p:spTree>
+      <p:nvGrpSpPr>
+        <p:cNvPr id="1" name=""/>
+        <p:cNvGrpSpPr/>
+        <p:nvPr/>
+      </p:nvGrpSpPr>
+      <p:grpSpPr>
+        <a:xfrm>
+          <a:off x="0" y="0"/>
+          <a:ext cx="0" cy="0"/>
+          <a:chOff x="0" y="0"/>
+          <a:chExt cx="0" cy="0"/>
+        </a:xfrm>
+      </p:grpSpPr>
+      <p:sp>
+        <p:nvSpPr>
+          <p:cNvPr id="161" name="PlaceHolder 1"/>
+          <p:cNvSpPr>
+            <a:spLocks noGrp="1"/>
+          </p:cNvSpPr>
+          <p:nvPr>
+            <p:ph type="sldImg"/>
+          </p:nvPr>
+        </p:nvSpPr>
+        <p:spPr>
+          <a:xfrm>
+            <a:off x="533520" y="764280"/>
+            <a:ext cx="6704640" cy="3771360"/>
+          </a:xfrm>
+          <a:prstGeom prst="rect">
+            <a:avLst/>
+          </a:prstGeom>
+        </p:spPr>
+      </p:sp>
+      <p:sp>
+        <p:nvSpPr>
+          <p:cNvPr id="162" name="PlaceHolder 2"/>
+          <p:cNvSpPr>
+            <a:spLocks noGrp="1"/>
+          </p:cNvSpPr>
+          <p:nvPr>
+            <p:ph type="body"/>
+          </p:nvPr>
+        </p:nvSpPr>
+        <p:spPr>
+          <a:xfrm>
+            <a:off x="777240" y="4777560"/>
+            <a:ext cx="6217560" cy="4525920"/>
+          </a:xfrm>
+          <a:prstGeom prst="rect">
+            <a:avLst/>
+          </a:prstGeom>
+        </p:spPr>
+        <p:txBody>
+          <a:bodyPr lIns="0" rIns="0" tIns="0" bIns="0">
+            <a:noAutofit/>
+          </a:bodyPr>
+          <a:p>
+            <a:r>
+              <a:rPr b="0" lang="en-US" sz="2000" spc="-1" strike="noStrike">
+                <a:latin typeface="Arial"/>
+              </a:rPr>
+              <a:t>Southern population larger, more healthy</a:t>
+            </a:r>
+            <a:endParaRPr b="0" lang="en-US" sz="2000" spc="-1" strike="noStrike">
+              <a:latin typeface="Arial"/>
+            </a:endParaRPr>
+          </a:p>
+        </p:txBody>
+      </p:sp>
+    </p:spTree>
+  </p:cSld>
+</p:notes>
+</file>
+
+<file path=ppt/notesSlides/notesSlide5.xml><?xml version="1.0" encoding="utf-8"?>
+<p:notes xmlns:a="http://schemas.openxmlformats.org/drawingml/2006/main" xmlns:p="http://schemas.openxmlformats.org/presentationml/2006/main" xmlns:r="http://schemas.openxmlformats.org/officeDocument/2006/relationships" xmlns:p14="http://schemas.microsoft.com/office/powerpoint/2010/main" xmlns:p15="http://schemas.microsoft.com/office/powerpoint/2012/main" xmlns:mc="http://schemas.openxmlformats.org/markup-compatibility/2006">
+  <p:cSld>
+    <p:spTree>
+      <p:nvGrpSpPr>
+        <p:cNvPr id="1" name=""/>
+        <p:cNvGrpSpPr/>
+        <p:nvPr/>
+      </p:nvGrpSpPr>
+      <p:grpSpPr>
+        <a:xfrm>
+          <a:off x="0" y="0"/>
+          <a:ext cx="0" cy="0"/>
+          <a:chOff x="0" y="0"/>
+          <a:chExt cx="0" cy="0"/>
+        </a:xfrm>
+      </p:grpSpPr>
+      <p:sp>
+        <p:nvSpPr>
+          <p:cNvPr id="163" name="PlaceHolder 1"/>
+          <p:cNvSpPr>
+            <a:spLocks noGrp="1"/>
+          </p:cNvSpPr>
+          <p:nvPr>
+            <p:ph type="sldImg"/>
+          </p:nvPr>
+        </p:nvSpPr>
+        <p:spPr>
+          <a:xfrm>
+            <a:off x="1371600" y="764280"/>
+            <a:ext cx="5028480" cy="3771360"/>
+          </a:xfrm>
+          <a:prstGeom prst="rect">
+            <a:avLst/>
+          </a:prstGeom>
+        </p:spPr>
+      </p:sp>
+      <p:sp>
+        <p:nvSpPr>
+          <p:cNvPr id="164" name="PlaceHolder 2"/>
+          <p:cNvSpPr>
+            <a:spLocks noGrp="1"/>
+          </p:cNvSpPr>
+          <p:nvPr>
+            <p:ph type="body"/>
+          </p:nvPr>
+        </p:nvSpPr>
+        <p:spPr>
+          <a:xfrm>
+            <a:off x="777240" y="4777560"/>
+            <a:ext cx="6217560" cy="4525920"/>
+          </a:xfrm>
+          <a:prstGeom prst="rect">
+            <a:avLst/>
+          </a:prstGeom>
+        </p:spPr>
+        <p:txBody>
+          <a:bodyPr lIns="0" rIns="0" tIns="0" bIns="0">
+            <a:noAutofit/>
+          </a:bodyPr>
+          <a:p>
+            <a:r>
+              <a:rPr b="0" lang="en-US" sz="2000" spc="-1" strike="noStrike">
+                <a:latin typeface="Arial"/>
+              </a:rPr>
+              <a:t>Where are the whales</a:t>
+            </a:r>
+            <a:endParaRPr b="0" lang="en-US" sz="2000" spc="-1" strike="noStrike">
+              <a:latin typeface="Arial"/>
+            </a:endParaRPr>
+          </a:p>
+          <a:p>
+            <a:r>
+              <a:rPr b="0" lang="en-US" sz="2000" spc="-1" strike="noStrike">
+                <a:latin typeface="Arial"/>
+              </a:rPr>
+              <a:t>When did they start moving from Bay of Fundy to Gulf of St, Lawrence? 2010</a:t>
+            </a:r>
+            <a:endParaRPr b="0" lang="en-US" sz="2000" spc="-1" strike="noStrike">
+              <a:latin typeface="Arial"/>
+            </a:endParaRPr>
+          </a:p>
+          <a:p>
+            <a:endParaRPr b="0" lang="en-US" sz="2000" spc="-1" strike="noStrike">
+              <a:latin typeface="Arial"/>
+            </a:endParaRPr>
+          </a:p>
+          <a:p>
+            <a:r>
+              <a:rPr b="0" lang="en-US" sz="2000" spc="-1" strike="noStrike">
+                <a:latin typeface="Arial"/>
+              </a:rPr>
+              <a:t>Map of current locations</a:t>
+            </a:r>
+            <a:endParaRPr b="0" lang="en-US" sz="2000" spc="-1" strike="noStrike">
+              <a:latin typeface="Arial"/>
+            </a:endParaRPr>
+          </a:p>
+          <a:p>
+            <a:endParaRPr b="0" lang="en-US" sz="2000" spc="-1" strike="noStrike">
+              <a:latin typeface="Arial"/>
+            </a:endParaRPr>
+          </a:p>
+          <a:p>
+            <a:r>
+              <a:rPr b="0" lang="en-US" sz="2000" spc="-1" strike="noStrike">
+                <a:latin typeface="Arial"/>
+              </a:rPr>
+              <a:t>Canadian Report on Gulf of St. Lawrence issues</a:t>
+            </a:r>
+            <a:endParaRPr b="0" lang="en-US" sz="2000" spc="-1" strike="noStrike">
+              <a:latin typeface="Arial"/>
+            </a:endParaRPr>
+          </a:p>
+        </p:txBody>
+      </p:sp>
+    </p:spTree>
+  </p:cSld>
+</p:notes>
+</file>
+
+<file path=ppt/notesSlides/notesSlide6.xml><?xml version="1.0" encoding="utf-8"?>
+<p:notes xmlns:a="http://schemas.openxmlformats.org/drawingml/2006/main" xmlns:p="http://schemas.openxmlformats.org/presentationml/2006/main" xmlns:r="http://schemas.openxmlformats.org/officeDocument/2006/relationships" xmlns:p14="http://schemas.microsoft.com/office/powerpoint/2010/main" xmlns:p15="http://schemas.microsoft.com/office/powerpoint/2012/main" xmlns:mc="http://schemas.openxmlformats.org/markup-compatibility/2006">
+  <p:cSld>
+    <p:spTree>
+      <p:nvGrpSpPr>
+        <p:cNvPr id="1" name=""/>
+        <p:cNvGrpSpPr/>
+        <p:nvPr/>
+      </p:nvGrpSpPr>
+      <p:grpSpPr>
+        <a:xfrm>
+          <a:off x="0" y="0"/>
+          <a:ext cx="0" cy="0"/>
+          <a:chOff x="0" y="0"/>
+          <a:chExt cx="0" cy="0"/>
+        </a:xfrm>
+      </p:grpSpPr>
+      <p:sp>
+        <p:nvSpPr>
+          <p:cNvPr id="165" name="PlaceHolder 1"/>
+          <p:cNvSpPr>
+            <a:spLocks noGrp="1"/>
+          </p:cNvSpPr>
+          <p:nvPr>
+            <p:ph type="sldImg"/>
+          </p:nvPr>
+        </p:nvSpPr>
+        <p:spPr>
+          <a:xfrm>
+            <a:off x="1371600" y="764280"/>
+            <a:ext cx="5028480" cy="3771360"/>
+          </a:xfrm>
+          <a:prstGeom prst="rect">
+            <a:avLst/>
+          </a:prstGeom>
+        </p:spPr>
+      </p:sp>
+      <p:sp>
+        <p:nvSpPr>
+          <p:cNvPr id="166" name="PlaceHolder 2"/>
+          <p:cNvSpPr>
+            <a:spLocks noGrp="1"/>
+          </p:cNvSpPr>
+          <p:nvPr>
+            <p:ph type="body"/>
+          </p:nvPr>
+        </p:nvSpPr>
+        <p:spPr>
+          <a:xfrm>
+            <a:off x="777240" y="4777560"/>
+            <a:ext cx="6217560" cy="4525920"/>
+          </a:xfrm>
+          <a:prstGeom prst="rect">
+            <a:avLst/>
+          </a:prstGeom>
+        </p:spPr>
+        <p:txBody>
+          <a:bodyPr lIns="0" rIns="0" tIns="0" bIns="0">
+            <a:noAutofit/>
+          </a:bodyPr>
+          <a:p>
+            <a:r>
+              <a:rPr b="0" lang="en-US" sz="2000" spc="-1" strike="noStrike">
+                <a:latin typeface="Arial"/>
+              </a:rPr>
+              <a:t>Boston Globe / Portland Herald series Lobster Trap</a:t>
+            </a:r>
+            <a:endParaRPr b="0" lang="en-US" sz="2000" spc="-1" strike="noStrike">
+              <a:latin typeface="Arial"/>
+            </a:endParaRPr>
+          </a:p>
+          <a:p>
+            <a:endParaRPr b="0" lang="en-US" sz="2000" spc="-1" strike="noStrike">
+              <a:latin typeface="Arial"/>
+            </a:endParaRPr>
+          </a:p>
+          <a:p>
+            <a:r>
+              <a:rPr b="0" lang="en-US" sz="2000" spc="-1" strike="noStrike">
+                <a:latin typeface="Arial"/>
+              </a:rPr>
+              <a:t>Graph of lobster take</a:t>
+            </a:r>
+            <a:endParaRPr b="0" lang="en-US" sz="2000" spc="-1" strike="noStrike">
+              <a:latin typeface="Arial"/>
+            </a:endParaRPr>
+          </a:p>
+        </p:txBody>
+      </p:sp>
+    </p:spTree>
+  </p:cSld>
+</p:notes>
+</file>
+
+<file path=ppt/notesSlides/notesSlide7.xml><?xml version="1.0" encoding="utf-8"?>
+<p:notes xmlns:a="http://schemas.openxmlformats.org/drawingml/2006/main" xmlns:p="http://schemas.openxmlformats.org/presentationml/2006/main" xmlns:r="http://schemas.openxmlformats.org/officeDocument/2006/relationships" xmlns:p14="http://schemas.microsoft.com/office/powerpoint/2010/main" xmlns:p15="http://schemas.microsoft.com/office/powerpoint/2012/main" xmlns:mc="http://schemas.openxmlformats.org/markup-compatibility/2006">
+  <p:cSld>
+    <p:spTree>
+      <p:nvGrpSpPr>
+        <p:cNvPr id="1" name=""/>
+        <p:cNvGrpSpPr/>
+        <p:nvPr/>
+      </p:nvGrpSpPr>
+      <p:grpSpPr>
+        <a:xfrm>
+          <a:off x="0" y="0"/>
+          <a:ext cx="0" cy="0"/>
+          <a:chOff x="0" y="0"/>
+          <a:chExt cx="0" cy="0"/>
+        </a:xfrm>
+      </p:grpSpPr>
+      <p:sp>
+        <p:nvSpPr>
+          <p:cNvPr id="167" name="PlaceHolder 1"/>
+          <p:cNvSpPr>
+            <a:spLocks noGrp="1"/>
+          </p:cNvSpPr>
+          <p:nvPr>
+            <p:ph type="sldImg"/>
+          </p:nvPr>
+        </p:nvSpPr>
+        <p:spPr>
+          <a:xfrm>
+            <a:off x="1371600" y="764280"/>
+            <a:ext cx="5028480" cy="3771360"/>
+          </a:xfrm>
+          <a:prstGeom prst="rect">
+            <a:avLst/>
+          </a:prstGeom>
+        </p:spPr>
+      </p:sp>
+      <p:sp>
+        <p:nvSpPr>
+          <p:cNvPr id="168" name="PlaceHolder 2"/>
+          <p:cNvSpPr>
+            <a:spLocks noGrp="1"/>
+          </p:cNvSpPr>
+          <p:nvPr>
+            <p:ph type="body"/>
+          </p:nvPr>
+        </p:nvSpPr>
+        <p:spPr>
+          <a:xfrm>
+            <a:off x="777240" y="4777560"/>
+            <a:ext cx="6217560" cy="6516720"/>
+          </a:xfrm>
+          <a:prstGeom prst="rect">
+            <a:avLst/>
+          </a:prstGeom>
+        </p:spPr>
+        <p:txBody>
+          <a:bodyPr lIns="0" rIns="0" tIns="0" bIns="0">
+            <a:noAutofit/>
+          </a:bodyPr>
+          <a:p>
+            <a:r>
+              <a:rPr b="0" lang="en-US" sz="2000" spc="-1" strike="noStrike">
+                <a:latin typeface="Arial"/>
+              </a:rPr>
+              <a:t>NOAA search – new regs</a:t>
+            </a:r>
+            <a:endParaRPr b="0" lang="en-US" sz="2000" spc="-1" strike="noStrike">
+              <a:latin typeface="Arial"/>
+            </a:endParaRPr>
+          </a:p>
+          <a:p>
+            <a:endParaRPr b="0" lang="en-US" sz="2000" spc="-1" strike="noStrike">
+              <a:latin typeface="Arial"/>
+            </a:endParaRPr>
+          </a:p>
+          <a:p>
+            <a:r>
+              <a:rPr b="0" lang="en-US" sz="2000" spc="-1" strike="noStrike">
+                <a:latin typeface="Arial"/>
+              </a:rPr>
+              <a:t>NOAA – federal regs</a:t>
+            </a:r>
+            <a:endParaRPr b="0" lang="en-US" sz="2000" spc="-1" strike="noStrike">
+              <a:latin typeface="Arial"/>
+            </a:endParaRPr>
+          </a:p>
+          <a:p>
+            <a:r>
+              <a:rPr b="0" lang="en-US" sz="2000" spc="-1" strike="noStrike">
+                <a:latin typeface="Arial"/>
+              </a:rPr>
+              <a:t>   </a:t>
+            </a:r>
+            <a:r>
+              <a:rPr b="0" lang="en-US" sz="2000" spc="-1" strike="noStrike">
+                <a:latin typeface="Arial"/>
+              </a:rPr>
+              <a:t>More traps per lines (depending on distance)</a:t>
+            </a:r>
+            <a:endParaRPr b="0" lang="en-US" sz="2000" spc="-1" strike="noStrike">
+              <a:latin typeface="Arial"/>
+            </a:endParaRPr>
+          </a:p>
+          <a:p>
+            <a:r>
+              <a:rPr b="0" lang="en-US" sz="2000" spc="-1" strike="noStrike">
+                <a:latin typeface="Arial"/>
+              </a:rPr>
+              <a:t>  </a:t>
+            </a:r>
+            <a:r>
+              <a:rPr b="0" lang="en-US" sz="2000" spc="-1" strike="noStrike">
+                <a:latin typeface="Arial"/>
+              </a:rPr>
+              <a:t>Allow ropeless gear – testing during winter</a:t>
+            </a:r>
+            <a:endParaRPr b="0" lang="en-US" sz="2000" spc="-1" strike="noStrike">
+              <a:latin typeface="Arial"/>
+            </a:endParaRPr>
+          </a:p>
+          <a:p>
+            <a:r>
+              <a:rPr b="0" lang="en-US" sz="2000" spc="-1" strike="noStrike">
+                <a:latin typeface="Arial"/>
+              </a:rPr>
+              <a:t>  </a:t>
+            </a:r>
+            <a:r>
+              <a:rPr b="0" lang="en-US" sz="2000" spc="-1" strike="noStrike">
+                <a:latin typeface="Arial"/>
+              </a:rPr>
+              <a:t>1700 pound rope breaks</a:t>
+            </a:r>
+            <a:endParaRPr b="0" lang="en-US" sz="2000" spc="-1" strike="noStrike">
+              <a:latin typeface="Arial"/>
+            </a:endParaRPr>
+          </a:p>
+          <a:p>
+            <a:r>
+              <a:rPr b="0" lang="en-US" sz="2000" spc="-1" strike="noStrike">
+                <a:latin typeface="Arial"/>
+              </a:rPr>
+              <a:t>  </a:t>
+            </a:r>
+            <a:r>
+              <a:rPr b="0" lang="en-US" sz="2000" spc="-1" strike="noStrike">
+                <a:latin typeface="Arial"/>
+              </a:rPr>
+              <a:t>Gear marking</a:t>
+            </a:r>
+            <a:endParaRPr b="0" lang="en-US" sz="2000" spc="-1" strike="noStrike">
+              <a:latin typeface="Arial"/>
+            </a:endParaRPr>
+          </a:p>
+          <a:p>
+            <a:endParaRPr b="0" lang="en-US" sz="2000" spc="-1" strike="noStrike">
+              <a:latin typeface="Arial"/>
+            </a:endParaRPr>
+          </a:p>
+          <a:p>
+            <a:r>
+              <a:rPr b="0" lang="en-US" sz="2000" spc="-1" strike="noStrike">
+                <a:latin typeface="Arial"/>
+              </a:rPr>
+              <a:t>comments, which represent up to 201,269 people, were in favor of stronger regulations to protect North Atlantic right whales.</a:t>
+            </a:r>
+            <a:endParaRPr b="0" lang="en-US" sz="2000" spc="-1" strike="noStrike">
+              <a:latin typeface="Arial"/>
+            </a:endParaRPr>
+          </a:p>
+          <a:p>
+            <a:endParaRPr b="0" lang="en-US" sz="2000" spc="-1" strike="noStrike">
+              <a:latin typeface="Arial"/>
+            </a:endParaRPr>
+          </a:p>
+          <a:p>
+            <a:r>
+              <a:rPr b="0" lang="en-US" sz="2000" spc="-1" strike="noStrike">
+                <a:latin typeface="Arial"/>
+              </a:rPr>
+              <a:t>Of the 336 unique commenters who identified themselves as fishermen, either directly or through context, 312 voiced opposition to all or part of the rule, 19 commented on particular provisions, but did not expressly support or oppose, and 5 supported the general idea of the rule, </a:t>
+            </a:r>
+            <a:endParaRPr b="0" lang="en-US" sz="2000" spc="-1" strike="noStrike">
+              <a:latin typeface="Arial"/>
+            </a:endParaRPr>
+          </a:p>
+          <a:p>
+            <a:endParaRPr b="0" lang="en-US" sz="2000" spc="-1" strike="noStrike">
+              <a:latin typeface="Arial"/>
+            </a:endParaRPr>
+          </a:p>
+          <a:p>
+            <a:r>
+              <a:rPr b="0" lang="en-US" sz="2000" spc="-1" strike="noStrike">
+                <a:latin typeface="Arial"/>
+              </a:rPr>
+              <a:t>economic analysis in Chapter 6 indicates the first-year cost of this rulemaking is $9.8 to $19.2 million, which is 3 percent of the landings value of the lobster fishery in 2019. </a:t>
+            </a:r>
+            <a:endParaRPr b="0" lang="en-US" sz="2000" spc="-1" strike="noStrike">
+              <a:latin typeface="Arial"/>
+            </a:endParaRPr>
+          </a:p>
+        </p:txBody>
+      </p:sp>
+    </p:spTree>
+  </p:cSld>
+</p:notes>
+</file>
+
+<file path=ppt/notesSlides/notesSlide9.xml><?xml version="1.0" encoding="utf-8"?>
+<p:notes xmlns:a="http://schemas.openxmlformats.org/drawingml/2006/main" xmlns:p="http://schemas.openxmlformats.org/presentationml/2006/main" xmlns:r="http://schemas.openxmlformats.org/officeDocument/2006/relationships" xmlns:p14="http://schemas.microsoft.com/office/powerpoint/2010/main" xmlns:p15="http://schemas.microsoft.com/office/powerpoint/2012/main" xmlns:mc="http://schemas.openxmlformats.org/markup-compatibility/2006">
+  <p:cSld>
+    <p:spTree>
+      <p:nvGrpSpPr>
+        <p:cNvPr id="1" name=""/>
+        <p:cNvGrpSpPr/>
+        <p:nvPr/>
+      </p:nvGrpSpPr>
+      <p:grpSpPr>
+        <a:xfrm>
+          <a:off x="0" y="0"/>
+          <a:ext cx="0" cy="0"/>
+          <a:chOff x="0" y="0"/>
+          <a:chExt cx="0" cy="0"/>
+        </a:xfrm>
+      </p:grpSpPr>
+      <p:sp>
+        <p:nvSpPr>
+          <p:cNvPr id="169" name="PlaceHolder 1"/>
+          <p:cNvSpPr>
+            <a:spLocks noGrp="1"/>
+          </p:cNvSpPr>
+          <p:nvPr>
+            <p:ph type="sldImg"/>
+          </p:nvPr>
+        </p:nvSpPr>
+        <p:spPr>
+          <a:xfrm>
+            <a:off x="1371600" y="764280"/>
+            <a:ext cx="5028480" cy="3771360"/>
+          </a:xfrm>
+          <a:prstGeom prst="rect">
+            <a:avLst/>
+          </a:prstGeom>
+        </p:spPr>
+      </p:sp>
+      <p:sp>
+        <p:nvSpPr>
+          <p:cNvPr id="170" name="PlaceHolder 2"/>
+          <p:cNvSpPr>
+            <a:spLocks noGrp="1"/>
+          </p:cNvSpPr>
+          <p:nvPr>
+            <p:ph type="body"/>
+          </p:nvPr>
+        </p:nvSpPr>
+        <p:spPr>
+          <a:xfrm>
+            <a:off x="777240" y="4777560"/>
+            <a:ext cx="6217560" cy="4525920"/>
+          </a:xfrm>
+          <a:prstGeom prst="rect">
+            <a:avLst/>
+          </a:prstGeom>
+        </p:spPr>
+        <p:txBody>
+          <a:bodyPr lIns="0" rIns="0" tIns="0" bIns="0">
+            <a:noAutofit/>
+          </a:bodyPr>
+          <a:p>
+            <a:r>
+              <a:rPr b="0" lang="en-US" sz="2000" spc="-1" strike="noStrike">
+                <a:latin typeface="Arial"/>
+              </a:rPr>
+              <a:t>SMELTS animation</a:t>
+            </a:r>
+            <a:endParaRPr b="0" lang="en-US" sz="2000" spc="-1" strike="noStrike">
+              <a:latin typeface="Arial"/>
+            </a:endParaRPr>
+          </a:p>
+        </p:txBody>
+      </p:sp>
+    </p:spTree>
+  </p:cSld>
+</p:notes>
 </file>
 
 <file path=ppt/slideLayouts/slideLayout1.xml><?xml version="1.0" encoding="utf-8"?>
@@ -4211,7 +5247,7 @@
         <p:spPr>
           <a:xfrm>
             <a:off x="76320" y="5791320"/>
-            <a:ext cx="836640" cy="967680"/>
+            <a:ext cx="836280" cy="967320"/>
           </a:xfrm>
           <a:prstGeom prst="rect">
             <a:avLst/>
@@ -4577,7 +5613,7 @@
         <p:spPr>
           <a:xfrm>
             <a:off x="76320" y="5791320"/>
-            <a:ext cx="836640" cy="967680"/>
+            <a:ext cx="836280" cy="967320"/>
           </a:xfrm>
           <a:prstGeom prst="rect">
             <a:avLst/>
@@ -4943,7 +5979,7 @@
         <p:spPr>
           <a:xfrm>
             <a:off x="76320" y="5791320"/>
-            <a:ext cx="836640" cy="967680"/>
+            <a:ext cx="836280" cy="967320"/>
           </a:xfrm>
           <a:prstGeom prst="rect">
             <a:avLst/>
@@ -5216,7 +6252,7 @@
       </p:grpSpPr>
       <p:grpSp>
         <p:nvGrpSpPr>
-          <p:cNvPr id="126" name="Group 1"/>
+          <p:cNvPr id="132" name="Group 1"/>
           <p:cNvGrpSpPr/>
           <p:nvPr/>
         </p:nvGrpSpPr>
@@ -5230,7 +6266,7 @@
         </p:grpSpPr>
         <p:sp>
           <p:nvSpPr>
-            <p:cNvPr id="127" name="Line 2"/>
+            <p:cNvPr id="133" name="Line 2"/>
             <p:cNvSpPr/>
             <p:nvPr/>
           </p:nvSpPr>
@@ -5264,7 +6300,7 @@
         </p:sp>
         <p:sp>
           <p:nvSpPr>
-            <p:cNvPr id="128" name="Line 3"/>
+            <p:cNvPr id="134" name="Line 3"/>
             <p:cNvSpPr/>
             <p:nvPr/>
           </p:nvSpPr>
@@ -5299,7 +6335,7 @@
       </p:grpSp>
       <p:pic>
         <p:nvPicPr>
-          <p:cNvPr id="129" name="Content Placeholder 3" descr=""/>
+          <p:cNvPr id="135" name="Content Placeholder 3" descr=""/>
           <p:cNvPicPr/>
           <p:nvPr/>
         </p:nvPicPr>
@@ -5310,7 +6346,7 @@
         <p:spPr>
           <a:xfrm>
             <a:off x="76320" y="5791320"/>
-            <a:ext cx="836640" cy="967680"/>
+            <a:ext cx="836280" cy="967320"/>
           </a:xfrm>
           <a:prstGeom prst="rect">
             <a:avLst/>
@@ -5322,14 +6358,14 @@
       </p:pic>
       <p:sp>
         <p:nvSpPr>
-          <p:cNvPr id="130" name="CustomShape 4"/>
+          <p:cNvPr id="136" name="CustomShape 4"/>
           <p:cNvSpPr/>
           <p:nvPr/>
         </p:nvSpPr>
         <p:spPr>
           <a:xfrm>
             <a:off x="457200" y="274680"/>
-            <a:ext cx="8228160" cy="1141560"/>
+            <a:ext cx="8227800" cy="1141200"/>
           </a:xfrm>
           <a:prstGeom prst="rect">
             <a:avLst/>
@@ -5414,14 +6450,14 @@
       </p:grpSpPr>
       <p:sp>
         <p:nvSpPr>
-          <p:cNvPr id="149" name="CustomShape 1"/>
+          <p:cNvPr id="155" name="CustomShape 1"/>
           <p:cNvSpPr/>
           <p:nvPr/>
         </p:nvSpPr>
         <p:spPr>
           <a:xfrm>
             <a:off x="914400" y="274680"/>
-            <a:ext cx="7770960" cy="1141560"/>
+            <a:ext cx="7770600" cy="1141200"/>
           </a:xfrm>
           <a:prstGeom prst="rect">
             <a:avLst/>
@@ -5465,14 +6501,14 @@
       </p:sp>
       <p:sp>
         <p:nvSpPr>
-          <p:cNvPr id="150" name="CustomShape 2"/>
+          <p:cNvPr id="156" name="CustomShape 2"/>
           <p:cNvSpPr/>
           <p:nvPr/>
         </p:nvSpPr>
         <p:spPr>
           <a:xfrm>
             <a:off x="859680" y="2203920"/>
-            <a:ext cx="8228160" cy="2066040"/>
+            <a:ext cx="8227800" cy="2065680"/>
           </a:xfrm>
           <a:prstGeom prst="rect">
             <a:avLst/>
@@ -5608,14 +6644,14 @@
       </p:grpSpPr>
       <p:sp>
         <p:nvSpPr>
-          <p:cNvPr id="131" name="CustomShape 1"/>
+          <p:cNvPr id="137" name="CustomShape 1"/>
           <p:cNvSpPr/>
           <p:nvPr/>
         </p:nvSpPr>
         <p:spPr>
           <a:xfrm>
             <a:off x="457200" y="274680"/>
-            <a:ext cx="8228160" cy="1141560"/>
+            <a:ext cx="8227800" cy="1141200"/>
           </a:xfrm>
           <a:prstGeom prst="rect">
             <a:avLst/>
@@ -5659,14 +6695,14 @@
       </p:sp>
       <p:sp>
         <p:nvSpPr>
-          <p:cNvPr id="132" name="CustomShape 2"/>
+          <p:cNvPr id="138" name="CustomShape 2"/>
           <p:cNvSpPr/>
           <p:nvPr/>
         </p:nvSpPr>
         <p:spPr>
           <a:xfrm>
             <a:off x="1605960" y="1426680"/>
-            <a:ext cx="8228160" cy="1848960"/>
+            <a:ext cx="8227800" cy="1848600"/>
           </a:xfrm>
           <a:prstGeom prst="rect">
             <a:avLst/>
@@ -5687,7 +6723,7 @@
             <a:noAutofit/>
           </a:bodyPr>
           <a:p>
-            <a:pPr marL="343080" indent="-341280">
+            <a:pPr marL="343080" indent="-340920">
               <a:lnSpc>
                 <a:spcPct val="100000"/>
               </a:lnSpc>
@@ -5729,7 +6765,7 @@
             </a:endParaRPr>
           </a:p>
           <a:p>
-            <a:pPr marL="343080" indent="-341280">
+            <a:pPr marL="343080" indent="-340920">
               <a:lnSpc>
                 <a:spcPct val="100000"/>
               </a:lnSpc>
@@ -5793,7 +6829,7 @@
             </a:endParaRPr>
           </a:p>
           <a:p>
-            <a:pPr marL="343080" indent="-341280">
+            <a:pPr marL="343080" indent="-340920">
               <a:lnSpc>
                 <a:spcPct val="100000"/>
               </a:lnSpc>
@@ -5823,7 +6859,7 @@
       </p:sp>
       <p:pic>
         <p:nvPicPr>
-          <p:cNvPr id="133" name="Picture 2" descr="Chart&#10;&#10;Description automatically generated"/>
+          <p:cNvPr id="139" name="Picture 2" descr="Chart&#10;&#10;Description automatically generated"/>
           <p:cNvPicPr/>
           <p:nvPr/>
         </p:nvPicPr>
@@ -5834,7 +6870,7 @@
         <p:spPr>
           <a:xfrm>
             <a:off x="2409480" y="3432600"/>
-            <a:ext cx="4438800" cy="2867400"/>
+            <a:ext cx="4438440" cy="2867040"/>
           </a:xfrm>
           <a:prstGeom prst="rect">
             <a:avLst/>
@@ -5876,14 +6912,14 @@
       </p:grpSpPr>
       <p:sp>
         <p:nvSpPr>
-          <p:cNvPr id="134" name="CustomShape 1"/>
+          <p:cNvPr id="140" name="CustomShape 1"/>
           <p:cNvSpPr/>
           <p:nvPr/>
         </p:nvSpPr>
         <p:spPr>
           <a:xfrm>
             <a:off x="914400" y="274680"/>
-            <a:ext cx="7770960" cy="1141560"/>
+            <a:ext cx="7770600" cy="1141200"/>
           </a:xfrm>
           <a:prstGeom prst="rect">
             <a:avLst/>
@@ -5927,14 +6963,14 @@
       </p:sp>
       <p:sp>
         <p:nvSpPr>
-          <p:cNvPr id="135" name="CustomShape 2"/>
+          <p:cNvPr id="141" name="CustomShape 2"/>
           <p:cNvSpPr/>
           <p:nvPr/>
         </p:nvSpPr>
         <p:spPr>
           <a:xfrm>
             <a:off x="903960" y="2743200"/>
-            <a:ext cx="8228160" cy="1141560"/>
+            <a:ext cx="8227800" cy="1141200"/>
           </a:xfrm>
           <a:prstGeom prst="rect">
             <a:avLst/>
@@ -5955,7 +6991,7 @@
             <a:normAutofit fontScale="78000"/>
           </a:bodyPr>
           <a:p>
-            <a:pPr marL="228600" indent="-227520">
+            <a:pPr marL="228600" indent="-227160">
               <a:lnSpc>
                 <a:spcPct val="90000"/>
               </a:lnSpc>
@@ -5985,7 +7021,7 @@
             </a:endParaRPr>
           </a:p>
           <a:p>
-            <a:pPr marL="228600" indent="-227520">
+            <a:pPr marL="228600" indent="-227160">
               <a:lnSpc>
                 <a:spcPct val="90000"/>
               </a:lnSpc>
@@ -6015,7 +7051,7 @@
             </a:endParaRPr>
           </a:p>
           <a:p>
-            <a:pPr marL="228600" indent="-227520">
+            <a:pPr marL="228600" indent="-227160">
               <a:lnSpc>
                 <a:spcPct val="90000"/>
               </a:lnSpc>
@@ -6046,14 +7082,14 @@
       </p:sp>
       <p:sp>
         <p:nvSpPr>
-          <p:cNvPr id="136" name="CustomShape 3"/>
+          <p:cNvPr id="142" name="CustomShape 3"/>
           <p:cNvSpPr/>
           <p:nvPr/>
         </p:nvSpPr>
         <p:spPr>
           <a:xfrm>
             <a:off x="1148400" y="4071240"/>
-            <a:ext cx="7738560" cy="2004480"/>
+            <a:ext cx="7738200" cy="2004120"/>
           </a:xfrm>
           <a:prstGeom prst="rect">
             <a:avLst/>
@@ -6074,7 +7110,7 @@
             <a:noAutofit/>
           </a:bodyPr>
           <a:p>
-            <a:pPr marL="228600" indent="-227520">
+            <a:pPr marL="228600" indent="-227160">
               <a:lnSpc>
                 <a:spcPct val="90000"/>
               </a:lnSpc>
@@ -6112,7 +7148,7 @@
             </a:endParaRPr>
           </a:p>
           <a:p>
-            <a:pPr marL="228600" indent="-227520">
+            <a:pPr marL="228600" indent="-227160">
               <a:lnSpc>
                 <a:spcPct val="90000"/>
               </a:lnSpc>
@@ -6140,7 +7176,7 @@
             </a:endParaRPr>
           </a:p>
           <a:p>
-            <a:pPr marL="228600" indent="-227520">
+            <a:pPr marL="228600" indent="-227160">
               <a:lnSpc>
                 <a:spcPct val="90000"/>
               </a:lnSpc>
@@ -6168,7 +7204,7 @@
             </a:endParaRPr>
           </a:p>
           <a:p>
-            <a:pPr marL="228600" indent="-227520">
+            <a:pPr marL="228600" indent="-227160">
               <a:lnSpc>
                 <a:spcPct val="90000"/>
               </a:lnSpc>
@@ -6199,7 +7235,7 @@
       </p:sp>
       <p:pic>
         <p:nvPicPr>
-          <p:cNvPr id="137" name="Picture 6" descr=""/>
+          <p:cNvPr id="143" name="Picture 6" descr=""/>
           <p:cNvPicPr/>
           <p:nvPr/>
         </p:nvPicPr>
@@ -6210,7 +7246,7 @@
         <p:spPr>
           <a:xfrm>
             <a:off x="1015200" y="1377360"/>
-            <a:ext cx="2454480" cy="1154160"/>
+            <a:ext cx="2454120" cy="1153800"/>
           </a:xfrm>
           <a:prstGeom prst="rect">
             <a:avLst/>
@@ -6252,14 +7288,14 @@
       </p:grpSpPr>
       <p:sp>
         <p:nvSpPr>
-          <p:cNvPr id="138" name="CustomShape 1"/>
+          <p:cNvPr id="144" name="CustomShape 1"/>
           <p:cNvSpPr/>
           <p:nvPr/>
         </p:nvSpPr>
         <p:spPr>
           <a:xfrm>
             <a:off x="914400" y="274680"/>
-            <a:ext cx="7770960" cy="1141560"/>
+            <a:ext cx="7770600" cy="1141200"/>
           </a:xfrm>
           <a:prstGeom prst="rect">
             <a:avLst/>
@@ -6305,14 +7341,14 @@
       </p:sp>
       <p:sp>
         <p:nvSpPr>
-          <p:cNvPr id="139" name="CustomShape 2"/>
+          <p:cNvPr id="145" name="CustomShape 2"/>
           <p:cNvSpPr/>
           <p:nvPr/>
         </p:nvSpPr>
         <p:spPr>
           <a:xfrm>
             <a:off x="1118520" y="1513800"/>
-            <a:ext cx="8228160" cy="4711320"/>
+            <a:ext cx="8227800" cy="4710960"/>
           </a:xfrm>
           <a:prstGeom prst="rect">
             <a:avLst/>
@@ -6333,7 +7369,7 @@
             <a:normAutofit fontScale="80000"/>
           </a:bodyPr>
           <a:p>
-            <a:pPr marL="228600" indent="-227520">
+            <a:pPr marL="228600" indent="-227160">
               <a:lnSpc>
                 <a:spcPct val="90000"/>
               </a:lnSpc>
@@ -6373,7 +7409,7 @@
             </a:endParaRPr>
           </a:p>
           <a:p>
-            <a:pPr marL="228600" indent="-227520">
+            <a:pPr marL="228600" indent="-227160">
               <a:lnSpc>
                 <a:spcPct val="90000"/>
               </a:lnSpc>
@@ -6425,7 +7461,7 @@
             </a:endParaRPr>
           </a:p>
           <a:p>
-            <a:pPr marL="228600" indent="-227520">
+            <a:pPr marL="228600" indent="-227160">
               <a:lnSpc>
                 <a:spcPct val="90000"/>
               </a:lnSpc>
@@ -6455,7 +7491,7 @@
             </a:endParaRPr>
           </a:p>
           <a:p>
-            <a:pPr marL="228600" indent="-227520">
+            <a:pPr marL="228600" indent="-227160">
               <a:lnSpc>
                 <a:spcPct val="90000"/>
               </a:lnSpc>
@@ -6483,7 +7519,7 @@
             </a:endParaRPr>
           </a:p>
           <a:p>
-            <a:pPr lvl="1" marL="685800" indent="-227520">
+            <a:pPr lvl="1" marL="685800" indent="-227160">
               <a:lnSpc>
                 <a:spcPct val="90000"/>
               </a:lnSpc>
@@ -6523,7 +7559,7 @@
             </a:endParaRPr>
           </a:p>
           <a:p>
-            <a:pPr lvl="2" marL="1143000" indent="-227520">
+            <a:pPr lvl="2" marL="1143000" indent="-227160">
               <a:lnSpc>
                 <a:spcPct val="90000"/>
               </a:lnSpc>
@@ -6551,7 +7587,7 @@
             </a:endParaRPr>
           </a:p>
           <a:p>
-            <a:pPr lvl="1" marL="685800" indent="-227520">
+            <a:pPr lvl="1" marL="685800" indent="-227160">
               <a:lnSpc>
                 <a:spcPct val="90000"/>
               </a:lnSpc>
@@ -6579,7 +7615,7 @@
             </a:endParaRPr>
           </a:p>
           <a:p>
-            <a:pPr marL="228600" indent="-227520">
+            <a:pPr marL="228600" indent="-227160">
               <a:lnSpc>
                 <a:spcPct val="90000"/>
               </a:lnSpc>
@@ -6607,7 +7643,7 @@
             </a:endParaRPr>
           </a:p>
           <a:p>
-            <a:pPr marL="228600" indent="-227520">
+            <a:pPr marL="228600" indent="-227160">
               <a:lnSpc>
                 <a:spcPct val="90000"/>
               </a:lnSpc>
@@ -6635,7 +7671,7 @@
             </a:endParaRPr>
           </a:p>
           <a:p>
-            <a:pPr lvl="1" marL="685800" indent="-227520">
+            <a:pPr lvl="1" marL="685800" indent="-227160">
               <a:lnSpc>
                 <a:spcPct val="90000"/>
               </a:lnSpc>
@@ -6663,7 +7699,7 @@
             </a:endParaRPr>
           </a:p>
           <a:p>
-            <a:pPr lvl="1" marL="685800" indent="-227520">
+            <a:pPr lvl="1" marL="685800" indent="-227160">
               <a:lnSpc>
                 <a:spcPct val="90000"/>
               </a:lnSpc>
@@ -6691,7 +7727,7 @@
             </a:endParaRPr>
           </a:p>
           <a:p>
-            <a:pPr lvl="1" marL="685800" indent="-227520">
+            <a:pPr lvl="1" marL="685800" indent="-227160">
               <a:lnSpc>
                 <a:spcPct val="90000"/>
               </a:lnSpc>
@@ -6719,7 +7755,7 @@
             </a:endParaRPr>
           </a:p>
           <a:p>
-            <a:pPr marL="228600" indent="-227520">
+            <a:pPr marL="228600" indent="-227160">
               <a:lnSpc>
                 <a:spcPct val="90000"/>
               </a:lnSpc>
@@ -6793,14 +7829,14 @@
       </p:grpSpPr>
       <p:sp>
         <p:nvSpPr>
-          <p:cNvPr id="140" name="CustomShape 1"/>
+          <p:cNvPr id="146" name="CustomShape 1"/>
           <p:cNvSpPr/>
           <p:nvPr/>
         </p:nvSpPr>
         <p:spPr>
           <a:xfrm>
             <a:off x="914400" y="274680"/>
-            <a:ext cx="7770960" cy="1141560"/>
+            <a:ext cx="7770600" cy="1141200"/>
           </a:xfrm>
           <a:prstGeom prst="rect">
             <a:avLst/>
@@ -6844,14 +7880,14 @@
       </p:sp>
       <p:sp>
         <p:nvSpPr>
-          <p:cNvPr id="141" name="CustomShape 2"/>
+          <p:cNvPr id="147" name="CustomShape 2"/>
           <p:cNvSpPr/>
           <p:nvPr/>
         </p:nvSpPr>
         <p:spPr>
           <a:xfrm>
             <a:off x="828000" y="2625480"/>
-            <a:ext cx="7860600" cy="2222640"/>
+            <a:ext cx="7860240" cy="2222640"/>
           </a:xfrm>
           <a:prstGeom prst="rect">
             <a:avLst/>
@@ -6979,14 +8015,14 @@
       </p:grpSpPr>
       <p:sp>
         <p:nvSpPr>
-          <p:cNvPr id="142" name="CustomShape 1"/>
+          <p:cNvPr id="148" name="CustomShape 1"/>
           <p:cNvSpPr/>
           <p:nvPr/>
         </p:nvSpPr>
         <p:spPr>
           <a:xfrm>
             <a:off x="914400" y="274680"/>
-            <a:ext cx="7770960" cy="1141560"/>
+            <a:ext cx="7770600" cy="1141200"/>
           </a:xfrm>
           <a:prstGeom prst="rect">
             <a:avLst/>
@@ -7032,14 +8068,14 @@
       </p:sp>
       <p:sp>
         <p:nvSpPr>
-          <p:cNvPr id="143" name="CustomShape 2"/>
+          <p:cNvPr id="149" name="CustomShape 2"/>
           <p:cNvSpPr/>
           <p:nvPr/>
         </p:nvSpPr>
         <p:spPr>
           <a:xfrm>
             <a:off x="915120" y="1371600"/>
-            <a:ext cx="7999560" cy="5257080"/>
+            <a:ext cx="7999200" cy="5256720"/>
           </a:xfrm>
           <a:prstGeom prst="rect">
             <a:avLst/>
@@ -7060,7 +8096,7 @@
             <a:normAutofit fontScale="45000"/>
           </a:bodyPr>
           <a:p>
-            <a:pPr marL="228600" indent="-227520">
+            <a:pPr marL="228600" indent="-227160">
               <a:lnSpc>
                 <a:spcPct val="90000"/>
               </a:lnSpc>
@@ -7100,7 +8136,7 @@
             </a:endParaRPr>
           </a:p>
           <a:p>
-            <a:pPr marL="228600" indent="-227520">
+            <a:pPr marL="228600" indent="-227160">
               <a:lnSpc>
                 <a:spcPct val="90000"/>
               </a:lnSpc>
@@ -7140,7 +8176,7 @@
             </a:endParaRPr>
           </a:p>
           <a:p>
-            <a:pPr marL="228600" indent="-227520">
+            <a:pPr marL="228600" indent="-227160">
               <a:lnSpc>
                 <a:spcPct val="90000"/>
               </a:lnSpc>
@@ -7170,7 +8206,7 @@
             </a:endParaRPr>
           </a:p>
           <a:p>
-            <a:pPr marL="228600" indent="-227520">
+            <a:pPr marL="228600" indent="-227160">
               <a:lnSpc>
                 <a:spcPct val="90000"/>
               </a:lnSpc>
@@ -7200,7 +8236,7 @@
             </a:endParaRPr>
           </a:p>
           <a:p>
-            <a:pPr marL="228600" indent="-227520">
+            <a:pPr marL="228600" indent="-227160">
               <a:lnSpc>
                 <a:spcPct val="90000"/>
               </a:lnSpc>
@@ -7250,7 +8286,7 @@
             </a:endParaRPr>
           </a:p>
           <a:p>
-            <a:pPr marL="228600" indent="-227520">
+            <a:pPr marL="228600" indent="-227160">
               <a:lnSpc>
                 <a:spcPct val="90000"/>
               </a:lnSpc>
@@ -7278,7 +8314,7 @@
             </a:endParaRPr>
           </a:p>
           <a:p>
-            <a:pPr marL="228600" indent="-227520">
+            <a:pPr marL="228600" indent="-227160">
               <a:lnSpc>
                 <a:spcPct val="90000"/>
               </a:lnSpc>
@@ -7308,7 +8344,7 @@
             </a:endParaRPr>
           </a:p>
           <a:p>
-            <a:pPr marL="228600" indent="-227520">
+            <a:pPr marL="228600" indent="-227160">
               <a:lnSpc>
                 <a:spcPct val="90000"/>
               </a:lnSpc>
@@ -7394,14 +8430,14 @@
       </p:grpSpPr>
       <p:sp>
         <p:nvSpPr>
-          <p:cNvPr id="144" name="CustomShape 1"/>
+          <p:cNvPr id="150" name="CustomShape 1"/>
           <p:cNvSpPr/>
           <p:nvPr/>
         </p:nvSpPr>
         <p:spPr>
           <a:xfrm>
             <a:off x="685800" y="274680"/>
-            <a:ext cx="7999560" cy="1141560"/>
+            <a:ext cx="7999200" cy="1141200"/>
           </a:xfrm>
           <a:prstGeom prst="rect">
             <a:avLst/>
@@ -7445,14 +8481,14 @@
       </p:sp>
       <p:sp>
         <p:nvSpPr>
-          <p:cNvPr id="145" name="CustomShape 2"/>
+          <p:cNvPr id="151" name="CustomShape 2"/>
           <p:cNvSpPr/>
           <p:nvPr/>
         </p:nvSpPr>
         <p:spPr>
           <a:xfrm>
             <a:off x="788040" y="1959480"/>
-            <a:ext cx="8228160" cy="3431880"/>
+            <a:ext cx="8227800" cy="3431520"/>
           </a:xfrm>
           <a:prstGeom prst="rect">
             <a:avLst/>
@@ -7473,7 +8509,7 @@
             <a:normAutofit fontScale="75000"/>
           </a:bodyPr>
           <a:p>
-            <a:pPr marL="571680" indent="-570600">
+            <a:pPr marL="571680" indent="-570240">
               <a:lnSpc>
                 <a:spcPct val="90000"/>
               </a:lnSpc>
@@ -7516,7 +8552,7 @@
             </a:endParaRPr>
           </a:p>
           <a:p>
-            <a:pPr marL="571680" indent="-570600">
+            <a:pPr marL="571680" indent="-570240">
               <a:lnSpc>
                 <a:spcPct val="90000"/>
               </a:lnSpc>
@@ -7559,7 +8595,7 @@
             </a:endParaRPr>
           </a:p>
           <a:p>
-            <a:pPr marL="571680" indent="-570600">
+            <a:pPr marL="571680" indent="-570240">
               <a:lnSpc>
                 <a:spcPct val="90000"/>
               </a:lnSpc>
@@ -7624,7 +8660,7 @@
             </a:endParaRPr>
           </a:p>
           <a:p>
-            <a:pPr marL="571680" indent="-570600">
+            <a:pPr marL="571680" indent="-570240">
               <a:lnSpc>
                 <a:spcPct val="90000"/>
               </a:lnSpc>
@@ -7652,7 +8688,7 @@
             </a:endParaRPr>
           </a:p>
           <a:p>
-            <a:pPr marL="571680" indent="-570600">
+            <a:pPr marL="571680" indent="-570240">
               <a:lnSpc>
                 <a:spcPct val="90000"/>
               </a:lnSpc>
@@ -7729,14 +8765,14 @@
       </p:grpSpPr>
       <p:sp>
         <p:nvSpPr>
-          <p:cNvPr id="146" name="CustomShape 1"/>
+          <p:cNvPr id="152" name="CustomShape 1"/>
           <p:cNvSpPr/>
           <p:nvPr/>
         </p:nvSpPr>
         <p:spPr>
           <a:xfrm>
             <a:off x="457200" y="274680"/>
-            <a:ext cx="8228160" cy="1141560"/>
+            <a:ext cx="8227800" cy="1141200"/>
           </a:xfrm>
           <a:prstGeom prst="rect">
             <a:avLst/>
@@ -7814,14 +8850,14 @@
       </p:sp>
       <p:sp>
         <p:nvSpPr>
-          <p:cNvPr id="147" name="CustomShape 2"/>
+          <p:cNvPr id="153" name="CustomShape 2"/>
           <p:cNvSpPr/>
           <p:nvPr/>
         </p:nvSpPr>
         <p:spPr>
           <a:xfrm>
             <a:off x="658440" y="1424880"/>
-            <a:ext cx="8803080" cy="4491360"/>
+            <a:ext cx="8802720" cy="4491000"/>
           </a:xfrm>
           <a:prstGeom prst="rect">
             <a:avLst/>
@@ -7842,7 +8878,7 @@
             <a:normAutofit/>
           </a:bodyPr>
           <a:p>
-            <a:pPr marL="571680" indent="-570600">
+            <a:pPr marL="571680" indent="-570240">
               <a:lnSpc>
                 <a:spcPct val="90000"/>
               </a:lnSpc>
@@ -7882,7 +8918,7 @@
             </a:endParaRPr>
           </a:p>
           <a:p>
-            <a:pPr marL="571680" indent="-570600">
+            <a:pPr marL="571680" indent="-570240">
               <a:lnSpc>
                 <a:spcPct val="90000"/>
               </a:lnSpc>
@@ -7910,7 +8946,7 @@
             </a:endParaRPr>
           </a:p>
           <a:p>
-            <a:pPr marL="571680" indent="-570600">
+            <a:pPr marL="571680" indent="-570240">
               <a:lnSpc>
                 <a:spcPct val="90000"/>
               </a:lnSpc>
@@ -7971,25 +9007,20 @@
             </a:endParaRPr>
           </a:p>
           <a:p>
-            <a:pPr lvl="1" marL="285840" indent="-284760">
+            <a:pPr>
               <a:lnSpc>
                 <a:spcPct val="90000"/>
               </a:lnSpc>
               <a:spcBef>
                 <a:spcPts val="499"/>
               </a:spcBef>
-              <a:buClr>
-                <a:srgbClr val="000000"/>
-              </a:buClr>
-              <a:buFont typeface="Arial"/>
-              <a:buChar char="•"/>
             </a:pPr>
             <a:endParaRPr b="0" lang="en-US" sz="1500" spc="-1" strike="noStrike">
               <a:latin typeface="Arial"/>
             </a:endParaRPr>
           </a:p>
           <a:p>
-            <a:pPr marL="571680" indent="-570600">
+            <a:pPr marL="571680" indent="-570240">
               <a:lnSpc>
                 <a:spcPct val="90000"/>
               </a:lnSpc>
@@ -8017,7 +9048,7 @@
             </a:endParaRPr>
           </a:p>
           <a:p>
-            <a:pPr marL="571680" indent="-570600">
+            <a:pPr marL="571680" indent="-570240">
               <a:lnSpc>
                 <a:spcPct val="90000"/>
               </a:lnSpc>
@@ -8103,14 +9134,14 @@
       </p:grpSpPr>
       <p:sp>
         <p:nvSpPr>
-          <p:cNvPr id="148" name="CustomShape 1"/>
+          <p:cNvPr id="154" name="CustomShape 1"/>
           <p:cNvSpPr/>
           <p:nvPr/>
         </p:nvSpPr>
         <p:spPr>
           <a:xfrm>
             <a:off x="457200" y="274680"/>
-            <a:ext cx="7581240" cy="5483520"/>
+            <a:ext cx="7580880" cy="5483160"/>
           </a:xfrm>
           <a:prstGeom prst="rect">
             <a:avLst/>
@@ -8131,7 +9162,7 @@
             <a:normAutofit fontScale="65000"/>
           </a:bodyPr>
           <a:p>
-            <a:pPr lvl="1" marL="285840" indent="-284760">
+            <a:pPr lvl="1" marL="285840" indent="-284400">
               <a:lnSpc>
                 <a:spcPct val="100000"/>
               </a:lnSpc>
@@ -8168,7 +9199,7 @@
             </a:endParaRPr>
           </a:p>
           <a:p>
-            <a:pPr lvl="1" marL="285840" indent="-284760">
+            <a:pPr lvl="1" marL="285840" indent="-284400">
               <a:lnSpc>
                 <a:spcPct val="100000"/>
               </a:lnSpc>
@@ -8205,7 +9236,7 @@
             </a:endParaRPr>
           </a:p>
           <a:p>
-            <a:pPr lvl="1" marL="285840" indent="-284760">
+            <a:pPr lvl="1" marL="285840" indent="-284400">
               <a:lnSpc>
                 <a:spcPct val="100000"/>
               </a:lnSpc>
@@ -8242,7 +9273,7 @@
             </a:endParaRPr>
           </a:p>
           <a:p>
-            <a:pPr lvl="2" marL="285840" indent="-284760">
+            <a:pPr lvl="2" marL="285840" indent="-284400">
               <a:lnSpc>
                 <a:spcPct val="100000"/>
               </a:lnSpc>
@@ -8279,7 +9310,7 @@
             </a:endParaRPr>
           </a:p>
           <a:p>
-            <a:pPr lvl="2" marL="285840" indent="-284760">
+            <a:pPr lvl="2" marL="285840" indent="-284400">
               <a:lnSpc>
                 <a:spcPct val="100000"/>
               </a:lnSpc>
@@ -8316,7 +9347,7 @@
             </a:endParaRPr>
           </a:p>
           <a:p>
-            <a:pPr lvl="1" marL="285840" indent="-284760">
+            <a:pPr lvl="1" marL="285840" indent="-284400">
               <a:lnSpc>
                 <a:spcPct val="100000"/>
               </a:lnSpc>
@@ -8353,7 +9384,7 @@
             </a:endParaRPr>
           </a:p>
           <a:p>
-            <a:pPr lvl="2" marL="285840" indent="-284760">
+            <a:pPr lvl="2" marL="285840" indent="-284400">
               <a:lnSpc>
                 <a:spcPct val="100000"/>
               </a:lnSpc>
@@ -8390,7 +9421,7 @@
             </a:endParaRPr>
           </a:p>
           <a:p>
-            <a:pPr lvl="2" marL="285840" indent="-284760">
+            <a:pPr lvl="2" marL="285840" indent="-284400">
               <a:lnSpc>
                 <a:spcPct val="100000"/>
               </a:lnSpc>
@@ -8425,7 +9456,7 @@
             </a:endParaRPr>
           </a:p>
           <a:p>
-            <a:pPr lvl="1" marL="285840" indent="-284760">
+            <a:pPr lvl="1" marL="285840" indent="-284400">
               <a:lnSpc>
                 <a:spcPct val="100000"/>
               </a:lnSpc>
@@ -8460,7 +9491,7 @@
             </a:endParaRPr>
           </a:p>
           <a:p>
-            <a:pPr lvl="1" marL="285840" indent="-284760">
+            <a:pPr lvl="1" marL="285840" indent="-284400">
               <a:lnSpc>
                 <a:spcPct val="100000"/>
               </a:lnSpc>
@@ -8519,7 +9550,7 @@
             </a:endParaRPr>
           </a:p>
           <a:p>
-            <a:pPr lvl="2" marL="285840" indent="-284760">
+            <a:pPr lvl="2" marL="285840" indent="-284400">
               <a:lnSpc>
                 <a:spcPct val="100000"/>
               </a:lnSpc>
@@ -9234,4 +10265,230 @@
     </a:fmtScheme>
   </a:themeElements>
 </a:theme>
+</file>
+
+<file path=ppt/theme/theme4.xml><?xml version="1.0" encoding="utf-8"?>
+<a:theme xmlns:a="http://schemas.openxmlformats.org/drawingml/2006/main" name="Office Theme">
+  <a:themeElements>
+    <a:clrScheme name="Office">
+      <a:dk1>
+        <a:sysClr val="windowText" lastClr="000000"/>
+      </a:dk1>
+      <a:lt1>
+        <a:sysClr val="window" lastClr="FFFFFF"/>
+      </a:lt1>
+      <a:dk2>
+        <a:srgbClr val="1f497d"/>
+      </a:dk2>
+      <a:lt2>
+        <a:srgbClr val="eeece1"/>
+      </a:lt2>
+      <a:accent1>
+        <a:srgbClr val="4f81bd"/>
+      </a:accent1>
+      <a:accent2>
+        <a:srgbClr val="c0504d"/>
+      </a:accent2>
+      <a:accent3>
+        <a:srgbClr val="9bbb59"/>
+      </a:accent3>
+      <a:accent4>
+        <a:srgbClr val="8064a2"/>
+      </a:accent4>
+      <a:accent5>
+        <a:srgbClr val="4bacc6"/>
+      </a:accent5>
+      <a:accent6>
+        <a:srgbClr val="f79646"/>
+      </a:accent6>
+      <a:hlink>
+        <a:srgbClr val="0000ff"/>
+      </a:hlink>
+      <a:folHlink>
+        <a:srgbClr val="800080"/>
+      </a:folHlink>
+    </a:clrScheme>
+    <a:fontScheme name="Office">
+      <a:majorFont>
+        <a:latin typeface="Arial"/>
+        <a:ea typeface="DejaVu Sans"/>
+        <a:cs typeface="DejaVu Sans"/>
+      </a:majorFont>
+      <a:minorFont>
+        <a:latin typeface="Arial"/>
+        <a:ea typeface="DejaVu Sans"/>
+        <a:cs typeface="DejaVu Sans"/>
+      </a:minorFont>
+    </a:fontScheme>
+    <a:fmtScheme name="Office">
+      <a:fillStyleLst>
+        <a:solidFill>
+          <a:schemeClr val="phClr"/>
+        </a:solidFill>
+        <a:gradFill rotWithShape="1">
+          <a:gsLst>
+            <a:gs pos="0">
+              <a:schemeClr val="phClr">
+                <a:tint val="50000"/>
+                <a:satMod val="300000"/>
+              </a:schemeClr>
+            </a:gs>
+            <a:gs pos="35000">
+              <a:schemeClr val="phClr">
+                <a:tint val="37000"/>
+                <a:satMod val="300000"/>
+              </a:schemeClr>
+            </a:gs>
+            <a:gs pos="100000">
+              <a:schemeClr val="phClr">
+                <a:tint val="15000"/>
+                <a:satMod val="350000"/>
+              </a:schemeClr>
+            </a:gs>
+          </a:gsLst>
+          <a:lin ang="16200000" scaled="1"/>
+        </a:gradFill>
+        <a:gradFill rotWithShape="1">
+          <a:gsLst>
+            <a:gs pos="0">
+              <a:schemeClr val="phClr">
+                <a:shade val="51000"/>
+                <a:satMod val="130000"/>
+              </a:schemeClr>
+            </a:gs>
+            <a:gs pos="80000">
+              <a:schemeClr val="phClr">
+                <a:shade val="93000"/>
+                <a:satMod val="130000"/>
+              </a:schemeClr>
+            </a:gs>
+            <a:gs pos="100000">
+              <a:schemeClr val="phClr">
+                <a:shade val="94000"/>
+                <a:satMod val="135000"/>
+              </a:schemeClr>
+            </a:gs>
+          </a:gsLst>
+          <a:lin ang="16200000" scaled="0"/>
+        </a:gradFill>
+      </a:fillStyleLst>
+      <a:lnStyleLst>
+        <a:ln w="9525" cap="flat" cmpd="sng" algn="ctr">
+          <a:solidFill>
+            <a:schemeClr val="phClr">
+              <a:shade val="95000"/>
+              <a:satMod val="105000"/>
+            </a:schemeClr>
+          </a:solidFill>
+          <a:prstDash val="solid"/>
+          <a:miter/>
+        </a:ln>
+        <a:ln w="25400" cap="flat" cmpd="sng" algn="ctr">
+          <a:solidFill>
+            <a:schemeClr val="phClr"/>
+          </a:solidFill>
+          <a:prstDash val="solid"/>
+          <a:miter/>
+        </a:ln>
+        <a:ln w="38100" cap="flat" cmpd="sng" algn="ctr">
+          <a:solidFill>
+            <a:schemeClr val="phClr"/>
+          </a:solidFill>
+          <a:prstDash val="solid"/>
+          <a:miter/>
+        </a:ln>
+      </a:lnStyleLst>
+      <a:effectStyleLst>
+        <a:effectStyle>
+          <a:effectLst>
+            <a:outerShdw blurRad="40000" dist="20000" dir="5400000" rotWithShape="0">
+              <a:srgbClr val="000000">
+                <a:alpha val="38000"/>
+              </a:srgbClr>
+            </a:outerShdw>
+          </a:effectLst>
+        </a:effectStyle>
+        <a:effectStyle>
+          <a:effectLst>
+            <a:outerShdw blurRad="40000" dist="23000" dir="5400000" rotWithShape="0">
+              <a:srgbClr val="000000">
+                <a:alpha val="35000"/>
+              </a:srgbClr>
+            </a:outerShdw>
+          </a:effectLst>
+        </a:effectStyle>
+        <a:effectStyle>
+          <a:effectLst>
+            <a:outerShdw blurRad="40000" dist="23000" dir="5400000" rotWithShape="0">
+              <a:srgbClr val="000000">
+                <a:alpha val="35000"/>
+              </a:srgbClr>
+            </a:outerShdw>
+          </a:effectLst>
+          <a:scene3d>
+            <a:camera prst="orthographicFront">
+              <a:rot lat="0" lon="0" rev="0"/>
+            </a:camera>
+            <a:lightRig rig="threePt" dir="t">
+              <a:rot lat="0" lon="0" rev="1200000"/>
+            </a:lightRig>
+          </a:scene3d>
+          <a:sp3d>
+            <a:bevelT w="63500" h="25400"/>
+          </a:sp3d>
+        </a:effectStyle>
+      </a:effectStyleLst>
+      <a:bgFillStyleLst>
+        <a:solidFill>
+          <a:schemeClr val="phClr"/>
+        </a:solidFill>
+        <a:gradFill rotWithShape="1">
+          <a:gsLst>
+            <a:gs pos="0">
+              <a:schemeClr val="phClr">
+                <a:tint val="40000"/>
+                <a:satMod val="350000"/>
+              </a:schemeClr>
+            </a:gs>
+            <a:gs pos="40000">
+              <a:schemeClr val="phClr">
+                <a:tint val="45000"/>
+                <a:shade val="99000"/>
+                <a:satMod val="350000"/>
+              </a:schemeClr>
+            </a:gs>
+            <a:gs pos="100000">
+              <a:schemeClr val="phClr">
+                <a:shade val="20000"/>
+                <a:satMod val="255000"/>
+              </a:schemeClr>
+            </a:gs>
+          </a:gsLst>
+          <a:path path="circle">
+            <a:fillToRect l="50000" t="-80000" r="50000" b="180000"/>
+          </a:path>
+        </a:gradFill>
+        <a:gradFill rotWithShape="1">
+          <a:gsLst>
+            <a:gs pos="0">
+              <a:schemeClr val="phClr">
+                <a:tint val="80000"/>
+                <a:satMod val="300000"/>
+              </a:schemeClr>
+            </a:gs>
+            <a:gs pos="100000">
+              <a:schemeClr val="phClr">
+                <a:shade val="30000"/>
+                <a:satMod val="200000"/>
+              </a:schemeClr>
+            </a:gs>
+          </a:gsLst>
+          <a:path path="circle">
+            <a:fillToRect l="50000" t="50000" r="50000" b="50000"/>
+          </a:path>
+        </a:gradFill>
+      </a:bgFillStyleLst>
+    </a:fmtScheme>
+  </a:themeElements>
+</a:theme>
 </file>
</xml_diff>